<commit_message>
Edit slides and files
</commit_message>
<xml_diff>
--- a/SLIDES/05-events.pptx
+++ b/SLIDES/05-events.pptx
@@ -7,10 +7,11 @@
   <p:sldIdLst>
     <p:sldId id="259" r:id="rId2"/>
     <p:sldId id="262" r:id="rId3"/>
-    <p:sldId id="261" r:id="rId4"/>
-    <p:sldId id="260" r:id="rId5"/>
-    <p:sldId id="257" r:id="rId6"/>
-    <p:sldId id="258" r:id="rId7"/>
+    <p:sldId id="263" r:id="rId4"/>
+    <p:sldId id="261" r:id="rId5"/>
+    <p:sldId id="260" r:id="rId6"/>
+    <p:sldId id="257" r:id="rId7"/>
+    <p:sldId id="258" r:id="rId8"/>
   </p:sldIdLst>
   <p:sldSz cx="12192000" cy="6858000"/>
   <p:notesSz cx="6858000" cy="9144000"/>
@@ -3716,6 +3717,179 @@
           <a:lstStyle/>
           <a:p>
             <a:r>
+              <a:rPr lang="en-GB"/>
+              <a:t>attributeChangedCallback()</a:t>
+            </a:r>
+            <a:endParaRPr lang="en-GB" dirty="0"/>
+          </a:p>
+        </p:txBody>
+      </p:sp>
+      <p:sp>
+        <p:nvSpPr>
+          <p:cNvPr id="16" name="TextBox 15">
+            <a:extLst>
+              <a:ext uri="{FF2B5EF4-FFF2-40B4-BE49-F238E27FC236}">
+                <a16:creationId xmlns:a16="http://schemas.microsoft.com/office/drawing/2014/main" id="{61DC7D6D-E87F-488F-9904-85B270FACA5D}"/>
+              </a:ext>
+            </a:extLst>
+          </p:cNvPr>
+          <p:cNvSpPr txBox="1"/>
+          <p:nvPr/>
+        </p:nvSpPr>
+        <p:spPr>
+          <a:xfrm>
+            <a:off x="5396864" y="5135000"/>
+            <a:ext cx="4626702" cy="923330"/>
+          </a:xfrm>
+          <a:prstGeom prst="rect">
+            <a:avLst/>
+          </a:prstGeom>
+          <a:noFill/>
+        </p:spPr>
+        <p:txBody>
+          <a:bodyPr wrap="square" rtlCol="0">
+            <a:spAutoFit/>
+          </a:bodyPr>
+          <a:lstStyle/>
+          <a:p>
+            <a:r>
+              <a:rPr lang="en-GB" dirty="0">
+                <a:solidFill>
+                  <a:schemeClr val="bg1"/>
+                </a:solidFill>
+              </a:rPr>
+              <a:t>A design choice if you want colleagues/clients to access methods and properties directly or whether you restrict to props only.</a:t>
+            </a:r>
+          </a:p>
+        </p:txBody>
+      </p:sp>
+      <p:pic>
+        <p:nvPicPr>
+          <p:cNvPr id="6" name="Content Placeholder 5" descr="Text&#10;&#10;Description automatically generated">
+            <a:extLst>
+              <a:ext uri="{FF2B5EF4-FFF2-40B4-BE49-F238E27FC236}">
+                <a16:creationId xmlns:a16="http://schemas.microsoft.com/office/drawing/2014/main" id="{14EA3E83-054E-4FD2-9C32-30D4069B9276}"/>
+              </a:ext>
+            </a:extLst>
+          </p:cNvPr>
+          <p:cNvPicPr>
+            <a:picLocks noGrp="1" noChangeAspect="1"/>
+          </p:cNvPicPr>
+          <p:nvPr>
+            <p:ph idx="1"/>
+          </p:nvPr>
+        </p:nvPicPr>
+        <p:blipFill>
+          <a:blip r:embed="rId2">
+            <a:extLst>
+              <a:ext uri="{28A0092B-C50C-407E-A947-70E740481C1C}">
+                <a14:useLocalDpi xmlns:a14="http://schemas.microsoft.com/office/drawing/2010/main" val="0"/>
+              </a:ext>
+            </a:extLst>
+          </a:blip>
+          <a:stretch>
+            <a:fillRect/>
+          </a:stretch>
+        </p:blipFill>
+        <p:spPr>
+          <a:xfrm>
+            <a:off x="870808" y="1527678"/>
+            <a:ext cx="10450383" cy="4172532"/>
+          </a:xfrm>
+        </p:spPr>
+      </p:pic>
+      <p:sp>
+        <p:nvSpPr>
+          <p:cNvPr id="7" name="TextBox 6">
+            <a:extLst>
+              <a:ext uri="{FF2B5EF4-FFF2-40B4-BE49-F238E27FC236}">
+                <a16:creationId xmlns:a16="http://schemas.microsoft.com/office/drawing/2014/main" id="{357217D5-1BDA-4C78-B749-F171122C70A6}"/>
+              </a:ext>
+            </a:extLst>
+          </p:cNvPr>
+          <p:cNvSpPr txBox="1"/>
+          <p:nvPr/>
+        </p:nvSpPr>
+        <p:spPr>
+          <a:xfrm>
+            <a:off x="7105650" y="2105025"/>
+            <a:ext cx="3228975" cy="369332"/>
+          </a:xfrm>
+          <a:prstGeom prst="rect">
+            <a:avLst/>
+          </a:prstGeom>
+          <a:noFill/>
+        </p:spPr>
+        <p:txBody>
+          <a:bodyPr wrap="square" rtlCol="0">
+            <a:spAutoFit/>
+          </a:bodyPr>
+          <a:lstStyle/>
+          <a:p>
+            <a:r>
+              <a:rPr lang="en-GB" dirty="0"/>
+              <a:t>&lt;</a:t>
+            </a:r>
+          </a:p>
+        </p:txBody>
+      </p:sp>
+    </p:spTree>
+    <p:extLst>
+      <p:ext uri="{BB962C8B-B14F-4D97-AF65-F5344CB8AC3E}">
+        <p14:creationId xmlns:p14="http://schemas.microsoft.com/office/powerpoint/2010/main" val="809393202"/>
+      </p:ext>
+    </p:extLst>
+  </p:cSld>
+  <p:clrMapOvr>
+    <a:masterClrMapping/>
+  </p:clrMapOvr>
+</p:sld>
+</file>
+
+<file path=ppt/slides/slide4.xml><?xml version="1.0" encoding="utf-8"?>
+<p:sld xmlns:a="http://schemas.openxmlformats.org/drawingml/2006/main" xmlns:r="http://schemas.openxmlformats.org/officeDocument/2006/relationships" xmlns:p="http://schemas.openxmlformats.org/presentationml/2006/main">
+  <p:cSld>
+    <p:spTree>
+      <p:nvGrpSpPr>
+        <p:cNvPr id="1" name=""/>
+        <p:cNvGrpSpPr/>
+        <p:nvPr/>
+      </p:nvGrpSpPr>
+      <p:grpSpPr>
+        <a:xfrm>
+          <a:off x="0" y="0"/>
+          <a:ext cx="0" cy="0"/>
+          <a:chOff x="0" y="0"/>
+          <a:chExt cx="0" cy="0"/>
+        </a:xfrm>
+      </p:grpSpPr>
+      <p:sp>
+        <p:nvSpPr>
+          <p:cNvPr id="2" name="Title 1">
+            <a:extLst>
+              <a:ext uri="{FF2B5EF4-FFF2-40B4-BE49-F238E27FC236}">
+                <a16:creationId xmlns:a16="http://schemas.microsoft.com/office/drawing/2014/main" id="{3A51D54B-786F-4FBA-A65C-349B226305AF}"/>
+              </a:ext>
+            </a:extLst>
+          </p:cNvPr>
+          <p:cNvSpPr>
+            <a:spLocks noGrp="1"/>
+          </p:cNvSpPr>
+          <p:nvPr>
+            <p:ph type="title"/>
+          </p:nvPr>
+        </p:nvSpPr>
+        <p:spPr>
+          <a:xfrm>
+            <a:off x="838200" y="0"/>
+            <a:ext cx="10515600" cy="1325563"/>
+          </a:xfrm>
+        </p:spPr>
+        <p:txBody>
+          <a:bodyPr/>
+          <a:lstStyle/>
+          <a:p>
+            <a:r>
               <a:rPr lang="en-GB" dirty="0"/>
               <a:t>Custom Events in JS</a:t>
             </a:r>
@@ -3814,7 +3988,7 @@
 </p:sld>
 </file>
 
-<file path=ppt/slides/slide4.xml><?xml version="1.0" encoding="utf-8"?>
+<file path=ppt/slides/slide5.xml><?xml version="1.0" encoding="utf-8"?>
 <p:sld xmlns:a="http://schemas.openxmlformats.org/drawingml/2006/main" xmlns:r="http://schemas.openxmlformats.org/officeDocument/2006/relationships" xmlns:p="http://schemas.openxmlformats.org/presentationml/2006/main">
   <p:cSld>
     <p:spTree>
@@ -4035,7 +4209,7 @@
 </p:sld>
 </file>
 
-<file path=ppt/slides/slide5.xml><?xml version="1.0" encoding="utf-8"?>
+<file path=ppt/slides/slide6.xml><?xml version="1.0" encoding="utf-8"?>
 <p:sld xmlns:a="http://schemas.openxmlformats.org/drawingml/2006/main" xmlns:r="http://schemas.openxmlformats.org/officeDocument/2006/relationships" xmlns:p="http://schemas.openxmlformats.org/presentationml/2006/main">
   <p:cSld>
     <p:spTree>
@@ -4703,7 +4877,7 @@
 </p:sld>
 </file>
 
-<file path=ppt/slides/slide6.xml><?xml version="1.0" encoding="utf-8"?>
+<file path=ppt/slides/slide7.xml><?xml version="1.0" encoding="utf-8"?>
 <p:sld xmlns:a="http://schemas.openxmlformats.org/drawingml/2006/main" xmlns:r="http://schemas.openxmlformats.org/officeDocument/2006/relationships" xmlns:p="http://schemas.openxmlformats.org/presentationml/2006/main">
   <p:cSld>
     <p:spTree>

</xml_diff>